<commit_message>
Refactored generation method and increased transparency on content
</commit_message>
<xml_diff>
--- a/src/powerpointgenerator/Assets/PolicyTemplate.pptx
+++ b/src/powerpointgenerator/Assets/PolicyTemplate.pptx
@@ -262,7 +262,7 @@
           <a:p>
             <a:fld id="{CF5C660C-50E5-B242-B3EF-2B7C8DA67512}" type="datetimeFigureOut">
               <a:rPr lang="en-US" smtClean="0"/>
-              <a:t>3/15/23</a:t>
+              <a:t>3/25/23</a:t>
             </a:fld>
             <a:endParaRPr lang="en-US"/>
           </a:p>
@@ -432,7 +432,7 @@
           <a:p>
             <a:fld id="{CF5C660C-50E5-B242-B3EF-2B7C8DA67512}" type="datetimeFigureOut">
               <a:rPr lang="en-US" smtClean="0"/>
-              <a:t>3/15/23</a:t>
+              <a:t>3/25/23</a:t>
             </a:fld>
             <a:endParaRPr lang="en-US"/>
           </a:p>
@@ -612,7 +612,7 @@
           <a:p>
             <a:fld id="{CF5C660C-50E5-B242-B3EF-2B7C8DA67512}" type="datetimeFigureOut">
               <a:rPr lang="en-US" smtClean="0"/>
-              <a:t>3/15/23</a:t>
+              <a:t>3/25/23</a:t>
             </a:fld>
             <a:endParaRPr lang="en-US"/>
           </a:p>
@@ -782,7 +782,7 @@
           <a:p>
             <a:fld id="{CF5C660C-50E5-B242-B3EF-2B7C8DA67512}" type="datetimeFigureOut">
               <a:rPr lang="en-US" smtClean="0"/>
-              <a:t>3/15/23</a:t>
+              <a:t>3/25/23</a:t>
             </a:fld>
             <a:endParaRPr lang="en-US"/>
           </a:p>
@@ -1028,7 +1028,7 @@
           <a:p>
             <a:fld id="{CF5C660C-50E5-B242-B3EF-2B7C8DA67512}" type="datetimeFigureOut">
               <a:rPr lang="en-US" smtClean="0"/>
-              <a:t>3/15/23</a:t>
+              <a:t>3/25/23</a:t>
             </a:fld>
             <a:endParaRPr lang="en-US"/>
           </a:p>
@@ -1260,7 +1260,7 @@
           <a:p>
             <a:fld id="{CF5C660C-50E5-B242-B3EF-2B7C8DA67512}" type="datetimeFigureOut">
               <a:rPr lang="en-US" smtClean="0"/>
-              <a:t>3/15/23</a:t>
+              <a:t>3/25/23</a:t>
             </a:fld>
             <a:endParaRPr lang="en-US"/>
           </a:p>
@@ -1627,7 +1627,7 @@
           <a:p>
             <a:fld id="{CF5C660C-50E5-B242-B3EF-2B7C8DA67512}" type="datetimeFigureOut">
               <a:rPr lang="en-US" smtClean="0"/>
-              <a:t>3/15/23</a:t>
+              <a:t>3/25/23</a:t>
             </a:fld>
             <a:endParaRPr lang="en-US"/>
           </a:p>
@@ -1745,7 +1745,7 @@
           <a:p>
             <a:fld id="{CF5C660C-50E5-B242-B3EF-2B7C8DA67512}" type="datetimeFigureOut">
               <a:rPr lang="en-US" smtClean="0"/>
-              <a:t>3/15/23</a:t>
+              <a:t>3/25/23</a:t>
             </a:fld>
             <a:endParaRPr lang="en-US"/>
           </a:p>
@@ -1840,7 +1840,7 @@
           <a:p>
             <a:fld id="{CF5C660C-50E5-B242-B3EF-2B7C8DA67512}" type="datetimeFigureOut">
               <a:rPr lang="en-US" smtClean="0"/>
-              <a:t>3/15/23</a:t>
+              <a:t>3/25/23</a:t>
             </a:fld>
             <a:endParaRPr lang="en-US"/>
           </a:p>
@@ -2117,7 +2117,7 @@
           <a:p>
             <a:fld id="{CF5C660C-50E5-B242-B3EF-2B7C8DA67512}" type="datetimeFigureOut">
               <a:rPr lang="en-US" smtClean="0"/>
-              <a:t>3/15/23</a:t>
+              <a:t>3/25/23</a:t>
             </a:fld>
             <a:endParaRPr lang="en-US"/>
           </a:p>
@@ -2374,7 +2374,7 @@
           <a:p>
             <a:fld id="{CF5C660C-50E5-B242-B3EF-2B7C8DA67512}" type="datetimeFigureOut">
               <a:rPr lang="en-US" smtClean="0"/>
-              <a:t>3/15/23</a:t>
+              <a:t>3/25/23</a:t>
             </a:fld>
             <a:endParaRPr lang="en-US"/>
           </a:p>
@@ -2587,7 +2587,7 @@
           <a:p>
             <a:fld id="{CF5C660C-50E5-B242-B3EF-2B7C8DA67512}" type="datetimeFigureOut">
               <a:rPr lang="en-US" smtClean="0"/>
-              <a:t>3/15/23</a:t>
+              <a:t>3/25/23</a:t>
             </a:fld>
             <a:endParaRPr lang="en-US"/>
           </a:p>
@@ -4308,7 +4308,7 @@
           <a:noFill/>
         </p:spPr>
         <p:txBody>
-          <a:bodyPr wrap="square" rtlCol="0">
+          <a:bodyPr wrap="square" numCol="1" rtlCol="0">
             <a:normAutofit/>
           </a:bodyPr>
           <a:lstStyle/>
@@ -6798,7 +6798,7 @@
           </a:prstGeom>
           <a:solidFill>
             <a:srgbClr val="FFFFFF">
-              <a:alpha val="92941"/>
+              <a:alpha val="80000"/>
             </a:srgbClr>
           </a:solidFill>
           <a:ln>
@@ -6852,7 +6852,7 @@
           </a:prstGeom>
           <a:solidFill>
             <a:srgbClr val="FFFFFF">
-              <a:alpha val="92941"/>
+              <a:alpha val="80000"/>
             </a:srgbClr>
           </a:solidFill>
           <a:ln>
@@ -6906,7 +6906,7 @@
           </a:prstGeom>
           <a:solidFill>
             <a:srgbClr val="FFFFFF">
-              <a:alpha val="92941"/>
+              <a:alpha val="80000"/>
             </a:srgbClr>
           </a:solidFill>
           <a:ln>
@@ -6960,7 +6960,7 @@
           </a:prstGeom>
           <a:solidFill>
             <a:srgbClr val="FFFFFF">
-              <a:alpha val="92941"/>
+              <a:alpha val="80000"/>
             </a:srgbClr>
           </a:solidFill>
           <a:ln>
@@ -7014,7 +7014,7 @@
           </a:prstGeom>
           <a:solidFill>
             <a:srgbClr val="FFFFFF">
-              <a:alpha val="92941"/>
+              <a:alpha val="80000"/>
             </a:srgbClr>
           </a:solidFill>
           <a:ln>
@@ -7068,7 +7068,7 @@
           </a:prstGeom>
           <a:solidFill>
             <a:srgbClr val="FFFFFF">
-              <a:alpha val="92941"/>
+              <a:alpha val="80000"/>
             </a:srgbClr>
           </a:solidFill>
           <a:ln>
@@ -7122,7 +7122,7 @@
           </a:prstGeom>
           <a:solidFill>
             <a:srgbClr val="FFFFFF">
-              <a:alpha val="92941"/>
+              <a:alpha val="80000"/>
             </a:srgbClr>
           </a:solidFill>
           <a:ln>
@@ -7176,7 +7176,7 @@
           </a:prstGeom>
           <a:solidFill>
             <a:srgbClr val="FFFFFF">
-              <a:alpha val="92941"/>
+              <a:alpha val="80000"/>
             </a:srgbClr>
           </a:solidFill>
           <a:ln>
@@ -7230,7 +7230,7 @@
           </a:prstGeom>
           <a:solidFill>
             <a:srgbClr val="FFFFFF">
-              <a:alpha val="92941"/>
+              <a:alpha val="80000"/>
             </a:srgbClr>
           </a:solidFill>
           <a:ln>
@@ -8152,7 +8152,7 @@
           </a:prstGeom>
           <a:solidFill>
             <a:srgbClr val="FFFFFF">
-              <a:alpha val="92941"/>
+              <a:alpha val="80000"/>
             </a:srgbClr>
           </a:solidFill>
           <a:ln>
@@ -8208,7 +8208,7 @@
           </a:prstGeom>
           <a:solidFill>
             <a:srgbClr val="FFFFFF">
-              <a:alpha val="92941"/>
+              <a:alpha val="80000"/>
             </a:srgbClr>
           </a:solidFill>
           <a:ln>
@@ -8264,7 +8264,7 @@
           </a:prstGeom>
           <a:solidFill>
             <a:srgbClr val="FFFFFF">
-              <a:alpha val="92941"/>
+              <a:alpha val="80000"/>
             </a:srgbClr>
           </a:solidFill>
           <a:ln>
@@ -8320,7 +8320,7 @@
           </a:prstGeom>
           <a:solidFill>
             <a:srgbClr val="FFFFFF">
-              <a:alpha val="92941"/>
+              <a:alpha val="80000"/>
             </a:srgbClr>
           </a:solidFill>
           <a:ln>
@@ -8647,7 +8647,7 @@
           </a:prstGeom>
           <a:solidFill>
             <a:srgbClr val="FFFFFF">
-              <a:alpha val="92941"/>
+              <a:alpha val="80000"/>
             </a:srgbClr>
           </a:solidFill>
           <a:ln>
@@ -8703,7 +8703,7 @@
           </a:prstGeom>
           <a:solidFill>
             <a:srgbClr val="FFFFFF">
-              <a:alpha val="92941"/>
+              <a:alpha val="80000"/>
             </a:srgbClr>
           </a:solidFill>
           <a:ln>
@@ -8834,7 +8834,7 @@
           </a:prstGeom>
           <a:solidFill>
             <a:srgbClr val="FFFFFF">
-              <a:alpha val="92941"/>
+              <a:alpha val="80000"/>
             </a:srgbClr>
           </a:solidFill>
           <a:ln>

</xml_diff>

<commit_message>
Updated version and added support for image exports
</commit_message>
<xml_diff>
--- a/src/powerpointgenerator/Assets/PolicyTemplate.pptx
+++ b/src/powerpointgenerator/Assets/PolicyTemplate.pptx
@@ -262,7 +262,7 @@
           <a:p>
             <a:fld id="{CF5C660C-50E5-B242-B3EF-2B7C8DA67512}" type="datetimeFigureOut">
               <a:rPr lang="en-US" smtClean="0"/>
-              <a:t>3/25/23</a:t>
+              <a:t>6/25/23</a:t>
             </a:fld>
             <a:endParaRPr lang="en-US"/>
           </a:p>
@@ -432,7 +432,7 @@
           <a:p>
             <a:fld id="{CF5C660C-50E5-B242-B3EF-2B7C8DA67512}" type="datetimeFigureOut">
               <a:rPr lang="en-US" smtClean="0"/>
-              <a:t>3/25/23</a:t>
+              <a:t>6/25/23</a:t>
             </a:fld>
             <a:endParaRPr lang="en-US"/>
           </a:p>
@@ -612,7 +612,7 @@
           <a:p>
             <a:fld id="{CF5C660C-50E5-B242-B3EF-2B7C8DA67512}" type="datetimeFigureOut">
               <a:rPr lang="en-US" smtClean="0"/>
-              <a:t>3/25/23</a:t>
+              <a:t>6/25/23</a:t>
             </a:fld>
             <a:endParaRPr lang="en-US"/>
           </a:p>
@@ -782,7 +782,7 @@
           <a:p>
             <a:fld id="{CF5C660C-50E5-B242-B3EF-2B7C8DA67512}" type="datetimeFigureOut">
               <a:rPr lang="en-US" smtClean="0"/>
-              <a:t>3/25/23</a:t>
+              <a:t>6/25/23</a:t>
             </a:fld>
             <a:endParaRPr lang="en-US"/>
           </a:p>
@@ -1028,7 +1028,7 @@
           <a:p>
             <a:fld id="{CF5C660C-50E5-B242-B3EF-2B7C8DA67512}" type="datetimeFigureOut">
               <a:rPr lang="en-US" smtClean="0"/>
-              <a:t>3/25/23</a:t>
+              <a:t>6/25/23</a:t>
             </a:fld>
             <a:endParaRPr lang="en-US"/>
           </a:p>
@@ -1260,7 +1260,7 @@
           <a:p>
             <a:fld id="{CF5C660C-50E5-B242-B3EF-2B7C8DA67512}" type="datetimeFigureOut">
               <a:rPr lang="en-US" smtClean="0"/>
-              <a:t>3/25/23</a:t>
+              <a:t>6/25/23</a:t>
             </a:fld>
             <a:endParaRPr lang="en-US"/>
           </a:p>
@@ -1627,7 +1627,7 @@
           <a:p>
             <a:fld id="{CF5C660C-50E5-B242-B3EF-2B7C8DA67512}" type="datetimeFigureOut">
               <a:rPr lang="en-US" smtClean="0"/>
-              <a:t>3/25/23</a:t>
+              <a:t>6/25/23</a:t>
             </a:fld>
             <a:endParaRPr lang="en-US"/>
           </a:p>
@@ -1745,7 +1745,7 @@
           <a:p>
             <a:fld id="{CF5C660C-50E5-B242-B3EF-2B7C8DA67512}" type="datetimeFigureOut">
               <a:rPr lang="en-US" smtClean="0"/>
-              <a:t>3/25/23</a:t>
+              <a:t>6/25/23</a:t>
             </a:fld>
             <a:endParaRPr lang="en-US"/>
           </a:p>
@@ -1840,7 +1840,7 @@
           <a:p>
             <a:fld id="{CF5C660C-50E5-B242-B3EF-2B7C8DA67512}" type="datetimeFigureOut">
               <a:rPr lang="en-US" smtClean="0"/>
-              <a:t>3/25/23</a:t>
+              <a:t>6/25/23</a:t>
             </a:fld>
             <a:endParaRPr lang="en-US"/>
           </a:p>
@@ -2117,7 +2117,7 @@
           <a:p>
             <a:fld id="{CF5C660C-50E5-B242-B3EF-2B7C8DA67512}" type="datetimeFigureOut">
               <a:rPr lang="en-US" smtClean="0"/>
-              <a:t>3/25/23</a:t>
+              <a:t>6/25/23</a:t>
             </a:fld>
             <a:endParaRPr lang="en-US"/>
           </a:p>
@@ -2374,7 +2374,7 @@
           <a:p>
             <a:fld id="{CF5C660C-50E5-B242-B3EF-2B7C8DA67512}" type="datetimeFigureOut">
               <a:rPr lang="en-US" smtClean="0"/>
-              <a:t>3/25/23</a:t>
+              <a:t>6/25/23</a:t>
             </a:fld>
             <a:endParaRPr lang="en-US"/>
           </a:p>
@@ -2587,7 +2587,7 @@
           <a:p>
             <a:fld id="{CF5C660C-50E5-B242-B3EF-2B7C8DA67512}" type="datetimeFigureOut">
               <a:rPr lang="en-US" smtClean="0"/>
-              <a:t>3/25/23</a:t>
+              <a:t>6/25/23</a:t>
             </a:fld>
             <a:endParaRPr lang="en-US"/>
           </a:p>
@@ -5467,9 +5467,9 @@
         <p:grpSpPr>
           <a:xfrm>
             <a:off x="1927788" y="715249"/>
-            <a:ext cx="1574183" cy="365760"/>
+            <a:ext cx="1719285" cy="365760"/>
             <a:chOff x="3262737" y="994835"/>
-            <a:chExt cx="1574183" cy="365760"/>
+            <a:chExt cx="1719285" cy="365760"/>
           </a:xfrm>
         </p:grpSpPr>
         <p:pic>
@@ -5523,7 +5523,7 @@
           <p:spPr>
             <a:xfrm>
               <a:off x="3582397" y="1027255"/>
-              <a:ext cx="1254523" cy="261610"/>
+              <a:ext cx="1399625" cy="261610"/>
             </a:xfrm>
             <a:prstGeom prst="rect">
               <a:avLst/>
@@ -6574,8 +6574,8 @@
         </p:nvSpPr>
         <p:spPr>
           <a:xfrm>
-            <a:off x="1894903" y="630074"/>
-            <a:ext cx="1481482" cy="725502"/>
+            <a:off x="1863623" y="663409"/>
+            <a:ext cx="1773927" cy="725502"/>
           </a:xfrm>
           <a:prstGeom prst="rect">
             <a:avLst/>
@@ -6628,7 +6628,7 @@
         </p:nvSpPr>
         <p:spPr>
           <a:xfrm>
-            <a:off x="3765311" y="638268"/>
+            <a:off x="3802273" y="650246"/>
             <a:ext cx="1481482" cy="725502"/>
           </a:xfrm>
           <a:prstGeom prst="rect">
@@ -6683,7 +6683,7 @@
         <p:spPr>
           <a:xfrm>
             <a:off x="8217572" y="669110"/>
-            <a:ext cx="1481482" cy="725502"/>
+            <a:ext cx="1873684" cy="725502"/>
           </a:xfrm>
           <a:prstGeom prst="rect">
             <a:avLst/>
@@ -6736,8 +6736,8 @@
         </p:nvSpPr>
         <p:spPr>
           <a:xfrm>
-            <a:off x="5438956" y="627922"/>
-            <a:ext cx="1481482" cy="725502"/>
+            <a:off x="5438955" y="627922"/>
+            <a:ext cx="1873685" cy="725502"/>
           </a:xfrm>
           <a:prstGeom prst="rect">
             <a:avLst/>
@@ -6790,8 +6790,8 @@
         </p:nvSpPr>
         <p:spPr>
           <a:xfrm>
-            <a:off x="3369400" y="3534220"/>
-            <a:ext cx="1714104" cy="283304"/>
+            <a:off x="3369399" y="3534220"/>
+            <a:ext cx="2069555" cy="283304"/>
           </a:xfrm>
           <a:prstGeom prst="rect">
             <a:avLst/>
@@ -6845,7 +6845,7 @@
         <p:spPr>
           <a:xfrm>
             <a:off x="3350256" y="3869846"/>
-            <a:ext cx="1643713" cy="278013"/>
+            <a:ext cx="2069555" cy="278013"/>
           </a:xfrm>
           <a:prstGeom prst="rect">
             <a:avLst/>
@@ -6899,7 +6899,7 @@
         <p:spPr>
           <a:xfrm>
             <a:off x="3361852" y="4243205"/>
-            <a:ext cx="1643712" cy="270012"/>
+            <a:ext cx="2077102" cy="261103"/>
           </a:xfrm>
           <a:prstGeom prst="rect">
             <a:avLst/>
@@ -6953,7 +6953,7 @@
         <p:spPr>
           <a:xfrm>
             <a:off x="3353637" y="4552268"/>
-            <a:ext cx="1960007" cy="260553"/>
+            <a:ext cx="2160906" cy="298395"/>
           </a:xfrm>
           <a:prstGeom prst="rect">
             <a:avLst/>
@@ -7007,7 +7007,7 @@
         <p:spPr>
           <a:xfrm>
             <a:off x="3331918" y="4876027"/>
-            <a:ext cx="1673645" cy="267992"/>
+            <a:ext cx="2182625" cy="298394"/>
           </a:xfrm>
           <a:prstGeom prst="rect">
             <a:avLst/>
@@ -7060,8 +7060,8 @@
         </p:nvSpPr>
         <p:spPr>
           <a:xfrm>
-            <a:off x="3350257" y="5207226"/>
-            <a:ext cx="1608614" cy="293874"/>
+            <a:off x="3350256" y="5207226"/>
+            <a:ext cx="2122561" cy="293874"/>
           </a:xfrm>
           <a:prstGeom prst="rect">
             <a:avLst/>
@@ -7115,7 +7115,7 @@
         <p:spPr>
           <a:xfrm>
             <a:off x="3350257" y="5557021"/>
-            <a:ext cx="1309330" cy="287239"/>
+            <a:ext cx="2042006" cy="287239"/>
           </a:xfrm>
           <a:prstGeom prst="rect">
             <a:avLst/>
@@ -7169,7 +7169,7 @@
         <p:spPr>
           <a:xfrm>
             <a:off x="3331918" y="5899058"/>
-            <a:ext cx="1930261" cy="293874"/>
+            <a:ext cx="2182625" cy="293874"/>
           </a:xfrm>
           <a:prstGeom prst="rect">
             <a:avLst/>
@@ -7327,7 +7327,7 @@
         <p:spPr>
           <a:xfrm>
             <a:off x="9881750" y="3248255"/>
-            <a:ext cx="2111990" cy="3510149"/>
+            <a:ext cx="2220808" cy="3510149"/>
           </a:xfrm>
           <a:prstGeom prst="rect">
             <a:avLst/>
@@ -7526,7 +7526,7 @@
         <p:spPr>
           <a:xfrm>
             <a:off x="9864212" y="3243751"/>
-            <a:ext cx="2147544" cy="230832"/>
+            <a:ext cx="2238346" cy="237862"/>
           </a:xfrm>
           <a:prstGeom prst="rect">
             <a:avLst/>
@@ -8144,8 +8144,8 @@
         </p:nvSpPr>
         <p:spPr>
           <a:xfrm>
-            <a:off x="9959681" y="3548808"/>
-            <a:ext cx="1987008" cy="369332"/>
+            <a:off x="9959680" y="3548808"/>
+            <a:ext cx="2051597" cy="369332"/>
           </a:xfrm>
           <a:prstGeom prst="rect">
             <a:avLst/>
@@ -8201,7 +8201,7 @@
         <p:spPr>
           <a:xfrm>
             <a:off x="9978939" y="3884212"/>
-            <a:ext cx="1987008" cy="369332"/>
+            <a:ext cx="2087576" cy="369332"/>
           </a:xfrm>
           <a:prstGeom prst="rect">
             <a:avLst/>
@@ -8257,7 +8257,7 @@
         <p:spPr>
           <a:xfrm>
             <a:off x="9940787" y="4320077"/>
-            <a:ext cx="1987008" cy="369332"/>
+            <a:ext cx="2125728" cy="369332"/>
           </a:xfrm>
           <a:prstGeom prst="rect">
             <a:avLst/>
@@ -8313,7 +8313,7 @@
         <p:spPr>
           <a:xfrm>
             <a:off x="9938833" y="4746195"/>
-            <a:ext cx="1856273" cy="369332"/>
+            <a:ext cx="2072444" cy="369332"/>
           </a:xfrm>
           <a:prstGeom prst="rect">
             <a:avLst/>
@@ -8640,7 +8640,7 @@
         <p:spPr>
           <a:xfrm>
             <a:off x="9987595" y="5219780"/>
-            <a:ext cx="1938246" cy="369332"/>
+            <a:ext cx="2023682" cy="369332"/>
           </a:xfrm>
           <a:prstGeom prst="rect">
             <a:avLst/>
@@ -8696,7 +8696,7 @@
         <p:spPr>
           <a:xfrm>
             <a:off x="9996846" y="5986498"/>
-            <a:ext cx="1869089" cy="369332"/>
+            <a:ext cx="2014431" cy="369332"/>
           </a:xfrm>
           <a:prstGeom prst="rect">
             <a:avLst/>
@@ -8827,7 +8827,7 @@
         <p:spPr>
           <a:xfrm>
             <a:off x="9959681" y="5602709"/>
-            <a:ext cx="1800938" cy="369332"/>
+            <a:ext cx="2023682" cy="369332"/>
           </a:xfrm>
           <a:prstGeom prst="rect">
             <a:avLst/>
@@ -8917,8 +8917,8 @@
         </p:nvSpPr>
         <p:spPr>
           <a:xfrm>
-            <a:off x="10831347" y="388376"/>
-            <a:ext cx="1273161" cy="215444"/>
+            <a:off x="10556111" y="388376"/>
+            <a:ext cx="1548397" cy="215444"/>
           </a:xfrm>
           <a:prstGeom prst="rect">
             <a:avLst/>

</xml_diff>

<commit_message>
Added Microsoft Admin Icon
</commit_message>
<xml_diff>
--- a/src/powerpointgenerator/Assets/PolicyTemplate.pptx
+++ b/src/powerpointgenerator/Assets/PolicyTemplate.pptx
@@ -262,7 +262,7 @@
           <a:p>
             <a:fld id="{CF5C660C-50E5-B242-B3EF-2B7C8DA67512}" type="datetimeFigureOut">
               <a:rPr lang="en-US" smtClean="0"/>
-              <a:t>6/25/23</a:t>
+              <a:t>10/30/23</a:t>
             </a:fld>
             <a:endParaRPr lang="en-US"/>
           </a:p>
@@ -432,7 +432,7 @@
           <a:p>
             <a:fld id="{CF5C660C-50E5-B242-B3EF-2B7C8DA67512}" type="datetimeFigureOut">
               <a:rPr lang="en-US" smtClean="0"/>
-              <a:t>6/25/23</a:t>
+              <a:t>10/30/23</a:t>
             </a:fld>
             <a:endParaRPr lang="en-US"/>
           </a:p>
@@ -612,7 +612,7 @@
           <a:p>
             <a:fld id="{CF5C660C-50E5-B242-B3EF-2B7C8DA67512}" type="datetimeFigureOut">
               <a:rPr lang="en-US" smtClean="0"/>
-              <a:t>6/25/23</a:t>
+              <a:t>10/30/23</a:t>
             </a:fld>
             <a:endParaRPr lang="en-US"/>
           </a:p>
@@ -782,7 +782,7 @@
           <a:p>
             <a:fld id="{CF5C660C-50E5-B242-B3EF-2B7C8DA67512}" type="datetimeFigureOut">
               <a:rPr lang="en-US" smtClean="0"/>
-              <a:t>6/25/23</a:t>
+              <a:t>10/30/23</a:t>
             </a:fld>
             <a:endParaRPr lang="en-US"/>
           </a:p>
@@ -1028,7 +1028,7 @@
           <a:p>
             <a:fld id="{CF5C660C-50E5-B242-B3EF-2B7C8DA67512}" type="datetimeFigureOut">
               <a:rPr lang="en-US" smtClean="0"/>
-              <a:t>6/25/23</a:t>
+              <a:t>10/30/23</a:t>
             </a:fld>
             <a:endParaRPr lang="en-US"/>
           </a:p>
@@ -1260,7 +1260,7 @@
           <a:p>
             <a:fld id="{CF5C660C-50E5-B242-B3EF-2B7C8DA67512}" type="datetimeFigureOut">
               <a:rPr lang="en-US" smtClean="0"/>
-              <a:t>6/25/23</a:t>
+              <a:t>10/30/23</a:t>
             </a:fld>
             <a:endParaRPr lang="en-US"/>
           </a:p>
@@ -1627,7 +1627,7 @@
           <a:p>
             <a:fld id="{CF5C660C-50E5-B242-B3EF-2B7C8DA67512}" type="datetimeFigureOut">
               <a:rPr lang="en-US" smtClean="0"/>
-              <a:t>6/25/23</a:t>
+              <a:t>10/30/23</a:t>
             </a:fld>
             <a:endParaRPr lang="en-US"/>
           </a:p>
@@ -1745,7 +1745,7 @@
           <a:p>
             <a:fld id="{CF5C660C-50E5-B242-B3EF-2B7C8DA67512}" type="datetimeFigureOut">
               <a:rPr lang="en-US" smtClean="0"/>
-              <a:t>6/25/23</a:t>
+              <a:t>10/30/23</a:t>
             </a:fld>
             <a:endParaRPr lang="en-US"/>
           </a:p>
@@ -1840,7 +1840,7 @@
           <a:p>
             <a:fld id="{CF5C660C-50E5-B242-B3EF-2B7C8DA67512}" type="datetimeFigureOut">
               <a:rPr lang="en-US" smtClean="0"/>
-              <a:t>6/25/23</a:t>
+              <a:t>10/30/23</a:t>
             </a:fld>
             <a:endParaRPr lang="en-US"/>
           </a:p>
@@ -2117,7 +2117,7 @@
           <a:p>
             <a:fld id="{CF5C660C-50E5-B242-B3EF-2B7C8DA67512}" type="datetimeFigureOut">
               <a:rPr lang="en-US" smtClean="0"/>
-              <a:t>6/25/23</a:t>
+              <a:t>10/30/23</a:t>
             </a:fld>
             <a:endParaRPr lang="en-US"/>
           </a:p>
@@ -2374,7 +2374,7 @@
           <a:p>
             <a:fld id="{CF5C660C-50E5-B242-B3EF-2B7C8DA67512}" type="datetimeFigureOut">
               <a:rPr lang="en-US" smtClean="0"/>
-              <a:t>6/25/23</a:t>
+              <a:t>10/30/23</a:t>
             </a:fld>
             <a:endParaRPr lang="en-US"/>
           </a:p>
@@ -2587,7 +2587,7 @@
           <a:p>
             <a:fld id="{CF5C660C-50E5-B242-B3EF-2B7C8DA67512}" type="datetimeFigureOut">
               <a:rPr lang="en-US" smtClean="0"/>
-              <a:t>6/25/23</a:t>
+              <a:t>10/30/23</a:t>
             </a:fld>
             <a:endParaRPr lang="en-US"/>
           </a:p>
@@ -4998,7 +4998,7 @@
           <a:p>
             <a:r>
               <a:rPr lang="en-US" sz="1600" b="1" dirty="0"/>
-              <a:t>Register security information</a:t>
+              <a:t>Microsoft Admin Portals</a:t>
             </a:r>
           </a:p>
         </p:txBody>
@@ -8945,6 +8945,36 @@
           </a:p>
         </p:txBody>
       </p:sp>
+      <p:pic>
+        <p:nvPicPr>
+          <p:cNvPr id="104" name="IconMicrosoftAdminPortal" descr="A blue and white logo with a black background&#10;&#10;Description automatically generated">
+            <a:extLst>
+              <a:ext uri="{FF2B5EF4-FFF2-40B4-BE49-F238E27FC236}">
+                <a16:creationId xmlns:a16="http://schemas.microsoft.com/office/drawing/2014/main" id="{7C7F251E-483D-EE71-7BAE-BAF3069DEEE6}"/>
+              </a:ext>
+            </a:extLst>
+          </p:cNvPr>
+          <p:cNvPicPr>
+            <a:picLocks noChangeAspect="1"/>
+          </p:cNvPicPr>
+          <p:nvPr/>
+        </p:nvPicPr>
+        <p:blipFill>
+          <a:blip r:embed="rId76"/>
+          <a:stretch>
+            <a:fillRect/>
+          </a:stretch>
+        </p:blipFill>
+        <p:spPr>
+          <a:xfrm>
+            <a:off x="6303899" y="2725312"/>
+            <a:ext cx="843584" cy="843584"/>
+          </a:xfrm>
+          <a:prstGeom prst="rect">
+            <a:avLst/>
+          </a:prstGeom>
+        </p:spPr>
+      </p:pic>
     </p:spTree>
     <p:extLst>
       <p:ext uri="{BB962C8B-B14F-4D97-AF65-F5344CB8AC3E}">

</xml_diff>